<commit_message>
Working on final presentation. Initial save.
Added special thanks section, added banner for mechanical section.
</commit_message>
<xml_diff>
--- a/Docs/Presentation/Mock1.pptx
+++ b/Docs/Presentation/Mock1.pptx
@@ -2912,7 +2912,8 @@
           <a:p>
             <a:fld id="{CBAD5BDE-FAE2-45AC-B569-136072A7D13B}" type="datetimeFigureOut">
               <a:rPr lang="en-US" smtClean="0"/>
-              <a:t>11/6/2011</a:t>
+              <a:pPr/>
+              <a:t>11/10/2011</a:t>
             </a:fld>
             <a:endParaRPr lang="en-US"/>
           </a:p>
@@ -2954,6 +2955,7 @@
           <a:p>
             <a:fld id="{03F0D8DC-A810-4ACD-8363-F0EE3059ACB6}" type="slidenum">
               <a:rPr lang="en-US" smtClean="0"/>
+              <a:pPr/>
               <a:t>‹#›</a:t>
             </a:fld>
             <a:endParaRPr lang="en-US"/>
@@ -3313,6 +3315,7 @@
   <p:clrMapOvr>
     <a:masterClrMapping/>
   </p:clrMapOvr>
+  <p:transition/>
 </p:sldLayout>
 </file>
 
@@ -3425,7 +3428,8 @@
           <a:p>
             <a:fld id="{CBAD5BDE-FAE2-45AC-B569-136072A7D13B}" type="datetimeFigureOut">
               <a:rPr lang="en-US" smtClean="0"/>
-              <a:t>11/6/2011</a:t>
+              <a:pPr/>
+              <a:t>11/10/2011</a:t>
             </a:fld>
             <a:endParaRPr lang="en-US"/>
           </a:p>
@@ -3467,6 +3471,7 @@
           <a:p>
             <a:fld id="{03F0D8DC-A810-4ACD-8363-F0EE3059ACB6}" type="slidenum">
               <a:rPr lang="en-US" smtClean="0"/>
+              <a:pPr/>
               <a:t>‹#›</a:t>
             </a:fld>
             <a:endParaRPr lang="en-US"/>
@@ -3478,6 +3483,7 @@
   <p:clrMapOvr>
     <a:masterClrMapping/>
   </p:clrMapOvr>
+  <p:transition/>
 </p:sldLayout>
 </file>
 
@@ -3600,7 +3606,8 @@
           <a:p>
             <a:fld id="{CBAD5BDE-FAE2-45AC-B569-136072A7D13B}" type="datetimeFigureOut">
               <a:rPr lang="en-US" smtClean="0"/>
-              <a:t>11/6/2011</a:t>
+              <a:pPr/>
+              <a:t>11/10/2011</a:t>
             </a:fld>
             <a:endParaRPr lang="en-US"/>
           </a:p>
@@ -3642,6 +3649,7 @@
           <a:p>
             <a:fld id="{03F0D8DC-A810-4ACD-8363-F0EE3059ACB6}" type="slidenum">
               <a:rPr lang="en-US" smtClean="0"/>
+              <a:pPr/>
               <a:t>‹#›</a:t>
             </a:fld>
             <a:endParaRPr lang="en-US"/>
@@ -3653,6 +3661,7 @@
   <p:clrMapOvr>
     <a:masterClrMapping/>
   </p:clrMapOvr>
+  <p:transition/>
 </p:sldLayout>
 </file>
 
@@ -3765,7 +3774,8 @@
           <a:p>
             <a:fld id="{CBAD5BDE-FAE2-45AC-B569-136072A7D13B}" type="datetimeFigureOut">
               <a:rPr lang="en-US" smtClean="0"/>
-              <a:t>11/6/2011</a:t>
+              <a:pPr/>
+              <a:t>11/10/2011</a:t>
             </a:fld>
             <a:endParaRPr lang="en-US"/>
           </a:p>
@@ -3807,6 +3817,7 @@
           <a:p>
             <a:fld id="{03F0D8DC-A810-4ACD-8363-F0EE3059ACB6}" type="slidenum">
               <a:rPr lang="en-US" smtClean="0"/>
+              <a:pPr/>
               <a:t>‹#›</a:t>
             </a:fld>
             <a:endParaRPr lang="en-US"/>
@@ -3818,6 +3829,7 @@
   <p:clrMapOvr>
     <a:masterClrMapping/>
   </p:clrMapOvr>
+  <p:transition/>
 </p:sldLayout>
 </file>
 
@@ -6889,7 +6901,8 @@
           <a:p>
             <a:fld id="{CBAD5BDE-FAE2-45AC-B569-136072A7D13B}" type="datetimeFigureOut">
               <a:rPr lang="en-US" smtClean="0"/>
-              <a:t>11/6/2011</a:t>
+              <a:pPr/>
+              <a:t>11/10/2011</a:t>
             </a:fld>
             <a:endParaRPr lang="en-US"/>
           </a:p>
@@ -6931,6 +6944,7 @@
           <a:p>
             <a:fld id="{03F0D8DC-A810-4ACD-8363-F0EE3059ACB6}" type="slidenum">
               <a:rPr lang="en-US" smtClean="0"/>
+              <a:pPr/>
               <a:t>‹#›</a:t>
             </a:fld>
             <a:endParaRPr lang="en-US"/>
@@ -6942,6 +6956,7 @@
   <p:clrMapOvr>
     <a:overrideClrMapping bg1="lt1" tx1="dk1" bg2="lt2" tx2="dk2" accent1="accent1" accent2="accent2" accent3="accent3" accent4="accent4" accent5="accent5" accent6="accent6" hlink="hlink" folHlink="folHlink"/>
   </p:clrMapOvr>
+  <p:transition/>
 </p:sldLayout>
 </file>
 
@@ -7172,7 +7187,8 @@
           <a:p>
             <a:fld id="{CBAD5BDE-FAE2-45AC-B569-136072A7D13B}" type="datetimeFigureOut">
               <a:rPr lang="en-US" smtClean="0"/>
-              <a:t>11/6/2011</a:t>
+              <a:pPr/>
+              <a:t>11/10/2011</a:t>
             </a:fld>
             <a:endParaRPr lang="en-US"/>
           </a:p>
@@ -7214,6 +7230,7 @@
           <a:p>
             <a:fld id="{03F0D8DC-A810-4ACD-8363-F0EE3059ACB6}" type="slidenum">
               <a:rPr lang="en-US" smtClean="0"/>
+              <a:pPr/>
               <a:t>‹#›</a:t>
             </a:fld>
             <a:endParaRPr lang="en-US"/>
@@ -7225,6 +7242,7 @@
   <p:clrMapOvr>
     <a:masterClrMapping/>
   </p:clrMapOvr>
+  <p:transition/>
 </p:sldLayout>
 </file>
 
@@ -7589,7 +7607,8 @@
           <a:p>
             <a:fld id="{CBAD5BDE-FAE2-45AC-B569-136072A7D13B}" type="datetimeFigureOut">
               <a:rPr lang="en-US" smtClean="0"/>
-              <a:t>11/6/2011</a:t>
+              <a:pPr/>
+              <a:t>11/10/2011</a:t>
             </a:fld>
             <a:endParaRPr lang="en-US"/>
           </a:p>
@@ -7631,6 +7650,7 @@
           <a:p>
             <a:fld id="{03F0D8DC-A810-4ACD-8363-F0EE3059ACB6}" type="slidenum">
               <a:rPr lang="en-US" smtClean="0"/>
+              <a:pPr/>
               <a:t>‹#›</a:t>
             </a:fld>
             <a:endParaRPr lang="en-US"/>
@@ -7642,6 +7662,7 @@
   <p:clrMapOvr>
     <a:masterClrMapping/>
   </p:clrMapOvr>
+  <p:transition/>
 </p:sldLayout>
 </file>
 
@@ -7702,7 +7723,8 @@
           <a:p>
             <a:fld id="{CBAD5BDE-FAE2-45AC-B569-136072A7D13B}" type="datetimeFigureOut">
               <a:rPr lang="en-US" smtClean="0"/>
-              <a:t>11/6/2011</a:t>
+              <a:pPr/>
+              <a:t>11/10/2011</a:t>
             </a:fld>
             <a:endParaRPr lang="en-US"/>
           </a:p>
@@ -7744,6 +7766,7 @@
           <a:p>
             <a:fld id="{03F0D8DC-A810-4ACD-8363-F0EE3059ACB6}" type="slidenum">
               <a:rPr lang="en-US" smtClean="0"/>
+              <a:pPr/>
               <a:t>‹#›</a:t>
             </a:fld>
             <a:endParaRPr lang="en-US"/>
@@ -7755,6 +7778,7 @@
   <p:clrMapOvr>
     <a:masterClrMapping/>
   </p:clrMapOvr>
+  <p:transition/>
 </p:sldLayout>
 </file>
 
@@ -7792,7 +7816,8 @@
           <a:p>
             <a:fld id="{CBAD5BDE-FAE2-45AC-B569-136072A7D13B}" type="datetimeFigureOut">
               <a:rPr lang="en-US" smtClean="0"/>
-              <a:t>11/6/2011</a:t>
+              <a:pPr/>
+              <a:t>11/10/2011</a:t>
             </a:fld>
             <a:endParaRPr lang="en-US"/>
           </a:p>
@@ -7834,6 +7859,7 @@
           <a:p>
             <a:fld id="{03F0D8DC-A810-4ACD-8363-F0EE3059ACB6}" type="slidenum">
               <a:rPr lang="en-US" smtClean="0"/>
+              <a:pPr/>
               <a:t>‹#›</a:t>
             </a:fld>
             <a:endParaRPr lang="en-US"/>
@@ -7845,6 +7871,7 @@
   <p:clrMapOvr>
     <a:masterClrMapping/>
   </p:clrMapOvr>
+  <p:transition/>
 </p:sldLayout>
 </file>
 
@@ -7967,7 +7994,8 @@
           <a:p>
             <a:fld id="{CBAD5BDE-FAE2-45AC-B569-136072A7D13B}" type="datetimeFigureOut">
               <a:rPr lang="en-US" smtClean="0"/>
-              <a:t>11/6/2011</a:t>
+              <a:pPr/>
+              <a:t>11/10/2011</a:t>
             </a:fld>
             <a:endParaRPr lang="en-US"/>
           </a:p>
@@ -8009,6 +8037,7 @@
           <a:p>
             <a:fld id="{03F0D8DC-A810-4ACD-8363-F0EE3059ACB6}" type="slidenum">
               <a:rPr lang="en-US" smtClean="0"/>
+              <a:pPr/>
               <a:t>‹#›</a:t>
             </a:fld>
             <a:endParaRPr lang="en-US"/>
@@ -8323,6 +8352,7 @@
   <p:clrMapOvr>
     <a:masterClrMapping/>
   </p:clrMapOvr>
+  <p:transition/>
 </p:sldLayout>
 </file>
 
@@ -8453,7 +8483,8 @@
           <a:p>
             <a:fld id="{CBAD5BDE-FAE2-45AC-B569-136072A7D13B}" type="datetimeFigureOut">
               <a:rPr lang="en-US" smtClean="0"/>
-              <a:t>11/6/2011</a:t>
+              <a:pPr/>
+              <a:t>11/10/2011</a:t>
             </a:fld>
             <a:endParaRPr lang="en-US"/>
           </a:p>
@@ -8495,6 +8526,7 @@
           <a:p>
             <a:fld id="{03F0D8DC-A810-4ACD-8363-F0EE3059ACB6}" type="slidenum">
               <a:rPr lang="en-US" smtClean="0"/>
+              <a:pPr/>
               <a:t>‹#›</a:t>
             </a:fld>
             <a:endParaRPr lang="en-US"/>
@@ -8799,6 +8831,7 @@
   <p:clrMapOvr>
     <a:masterClrMapping/>
   </p:clrMapOvr>
+  <p:transition/>
 </p:sldLayout>
 </file>
 
@@ -9056,7 +9089,8 @@
           <a:p>
             <a:fld id="{CBAD5BDE-FAE2-45AC-B569-136072A7D13B}" type="datetimeFigureOut">
               <a:rPr lang="en-US" smtClean="0"/>
-              <a:t>11/6/2011</a:t>
+              <a:pPr/>
+              <a:t>11/10/2011</a:t>
             </a:fld>
             <a:endParaRPr lang="en-US"/>
           </a:p>
@@ -9130,6 +9164,7 @@
           <a:p>
             <a:fld id="{03F0D8DC-A810-4ACD-8363-F0EE3059ACB6}" type="slidenum">
               <a:rPr lang="en-US" smtClean="0"/>
+              <a:pPr/>
               <a:t>‹#›</a:t>
             </a:fld>
             <a:endParaRPr lang="en-US"/>
@@ -9189,6 +9224,7 @@
     <p:sldLayoutId id="2147483694" r:id="rId10"/>
     <p:sldLayoutId id="2147483695" r:id="rId11"/>
   </p:sldLayoutIdLst>
+  <p:transition/>
   <p:txStyles>
     <p:titleStyle>
       <a:lvl1pPr algn="l" defTabSz="914400" rtl="0" eaLnBrk="1" latinLnBrk="0" hangingPunct="1">
@@ -9580,12 +9616,51 @@
           <a:noFill/>
         </p:spPr>
       </p:pic>
+      <p:sp>
+        <p:nvSpPr>
+          <p:cNvPr id="4" name="TextBox 3"/>
+          <p:cNvSpPr txBox="1"/>
+          <p:nvPr/>
+        </p:nvSpPr>
+        <p:spPr>
+          <a:xfrm>
+            <a:off x="457200" y="533400"/>
+            <a:ext cx="7772400" cy="6001643"/>
+          </a:xfrm>
+          <a:prstGeom prst="rect">
+            <a:avLst/>
+          </a:prstGeom>
+          <a:noFill/>
+        </p:spPr>
+        <p:txBody>
+          <a:bodyPr wrap="square" rtlCol="0">
+            <a:spAutoFit/>
+          </a:bodyPr>
+          <a:lstStyle/>
+          <a:p>
+            <a:pPr algn="r"/>
+            <a:r>
+              <a:rPr lang="en-US" sz="9600" dirty="0" smtClean="0"/>
+              <a:t>don’t forget to credit Kaitlin for the </a:t>
+            </a:r>
+            <a:r>
+              <a:rPr lang="en-US" sz="9600" dirty="0" err="1" smtClean="0"/>
+              <a:t>ChalkBot</a:t>
+            </a:r>
+            <a:r>
+              <a:rPr lang="en-US" sz="9600" dirty="0" smtClean="0"/>
+              <a:t> logo</a:t>
+            </a:r>
+            <a:endParaRPr lang="en-US" sz="9600" dirty="0"/>
+          </a:p>
+        </p:txBody>
+      </p:sp>
     </p:spTree>
   </p:cSld>
   <p:clrMapOvr>
     <a:masterClrMapping/>
   </p:clrMapOvr>
-  <p:transition advTm="20000"/>
+  <p:transition/>
   <p:timing>
     <p:tnLst>
       <p:par>
@@ -9671,13 +9746,8 @@
           <a:p>
             <a:r>
               <a:rPr lang="en-US" dirty="0" smtClean="0"/>
-              <a:t>Uses common, off the shelf sidewalk chalk</a:t>
+              <a:t>Uses common, off the shelf sidewalk chalk.</a:t>
             </a:r>
-            <a:r>
-              <a:rPr lang="en-US" dirty="0" smtClean="0"/>
-              <a:t>.</a:t>
-            </a:r>
-            <a:endParaRPr lang="en-US" dirty="0" smtClean="0"/>
           </a:p>
         </p:txBody>
       </p:sp>
@@ -9712,7 +9782,7 @@
   <p:clrMapOvr>
     <a:masterClrMapping/>
   </p:clrMapOvr>
-  <p:transition advTm="55000"/>
+  <p:transition/>
   <p:timing>
     <p:tnLst>
       <p:par>
@@ -9895,7 +9965,7 @@
   <p:clrMapOvr>
     <a:masterClrMapping/>
   </p:clrMapOvr>
-  <p:transition advTm="55000"/>
+  <p:transition/>
   <p:timing>
     <p:tnLst>
       <p:par>
@@ -9953,11 +10023,7 @@
             </a:r>
             <a:r>
               <a:rPr lang="en-US" dirty="0" smtClean="0"/>
-              <a:t> </a:t>
-            </a:r>
-            <a:r>
-              <a:rPr lang="en-US" dirty="0" smtClean="0"/>
-              <a:t>Base and Chalk Feed</a:t>
+              <a:t> Base and Chalk Feed</a:t>
             </a:r>
             <a:endParaRPr lang="en-US" dirty="0"/>
           </a:p>
@@ -10036,7 +10102,7 @@
   <p:clrMapOvr>
     <a:masterClrMapping/>
   </p:clrMapOvr>
-  <p:transition advTm="55000"/>
+  <p:transition/>
   <p:timing>
     <p:tnLst>
       <p:par>
@@ -10121,7 +10187,7 @@
   <p:clrMapOvr>
     <a:masterClrMapping/>
   </p:clrMapOvr>
-  <p:transition advTm="55000"/>
+  <p:transition/>
   <p:timing>
     <p:tnLst>
       <p:par>

</xml_diff>